<commit_message>
vault backup: 05-04-2024 22:09:29
Affected files:
Index.md
Slides/Viaggio in Giappone.pptx
</commit_message>
<xml_diff>
--- a/Slides/Viaggio in Giappone.pptx
+++ b/Slides/Viaggio in Giappone.pptx
@@ -114,6 +114,11 @@
       </a:defRPr>
     </a:lvl9pPr>
   </p:defaultTextStyle>
+  <p:extLst>
+    <p:ext uri="{EFAFB233-063F-42B5-8137-9DF3F51BA10A}">
+      <p15:sldGuideLst xmlns:p15="http://schemas.microsoft.com/office/powerpoint/2012/main"/>
+    </p:ext>
+  </p:extLst>
 </p:presentation>
 </file>
 
@@ -520,7 +525,7 @@
           <a:p>
             <a:fld id="{83284890-85D2-4D7B-8EF5-15A9C1DB8F42}" type="datetimeFigureOut">
               <a:rPr lang="en-US" dirty="0"/>
-              <a:t>4/3/2024</a:t>
+              <a:t>4/5/2024</a:t>
             </a:fld>
             <a:endParaRPr lang="en-US" dirty="0"/>
           </a:p>
@@ -695,7 +700,7 @@
           <a:p>
             <a:fld id="{87157CC2-0FC8-4686-B024-99790E0F5162}" type="datetimeFigureOut">
               <a:rPr lang="en-US" dirty="0"/>
-              <a:t>4/3/2024</a:t>
+              <a:t>4/5/2024</a:t>
             </a:fld>
             <a:endParaRPr lang="en-US" dirty="0"/>
           </a:p>
@@ -870,7 +875,7 @@
           <a:p>
             <a:fld id="{F6764DA5-CD3D-4590-A511-FCD3BC7A793E}" type="datetimeFigureOut">
               <a:rPr lang="en-US" dirty="0"/>
-              <a:t>4/3/2024</a:t>
+              <a:t>4/5/2024</a:t>
             </a:fld>
             <a:endParaRPr lang="en-US" dirty="0"/>
           </a:p>
@@ -1035,7 +1040,7 @@
           <a:p>
             <a:fld id="{82F5661D-6934-4B32-B92C-470368BF1EC6}" type="datetimeFigureOut">
               <a:rPr lang="en-US" dirty="0"/>
-              <a:t>4/3/2024</a:t>
+              <a:t>4/5/2024</a:t>
             </a:fld>
             <a:endParaRPr lang="en-US" dirty="0"/>
           </a:p>
@@ -1343,7 +1348,7 @@
           <a:p>
             <a:fld id="{C6F822A4-8DA6-4447-9B1F-C5DB58435268}" type="datetimeFigureOut">
               <a:rPr lang="en-US" dirty="0"/>
-              <a:t>4/3/2024</a:t>
+              <a:t>4/5/2024</a:t>
             </a:fld>
             <a:endParaRPr lang="en-US" dirty="0"/>
           </a:p>
@@ -1725,7 +1730,7 @@
           <a:p>
             <a:fld id="{E548D31E-DCDA-41A7-9C67-C4B11B94D21D}" type="datetimeFigureOut">
               <a:rPr lang="en-US" dirty="0"/>
-              <a:t>4/3/2024</a:t>
+              <a:t>4/5/2024</a:t>
             </a:fld>
             <a:endParaRPr lang="en-US" dirty="0"/>
           </a:p>
@@ -2154,7 +2159,7 @@
           <a:p>
             <a:fld id="{9B3762C0-B258-48F1-ADE6-176B4174CCDD}" type="datetimeFigureOut">
               <a:rPr lang="en-US" dirty="0"/>
-              <a:t>4/3/2024</a:t>
+              <a:t>4/5/2024</a:t>
             </a:fld>
             <a:endParaRPr lang="en-US" dirty="0"/>
           </a:p>
@@ -2267,7 +2272,7 @@
           <a:p>
             <a:fld id="{677919A6-33EB-49BD-A62F-1FA56B9F9712}" type="datetimeFigureOut">
               <a:rPr lang="en-US" dirty="0"/>
-              <a:t>4/3/2024</a:t>
+              <a:t>4/5/2024</a:t>
             </a:fld>
             <a:endParaRPr lang="en-US" dirty="0"/>
           </a:p>
@@ -2357,7 +2362,7 @@
           <a:p>
             <a:fld id="{CA4E7D1B-D673-4CF6-8672-009D42ABD2A0}" type="datetimeFigureOut">
               <a:rPr lang="en-US" dirty="0"/>
-              <a:t>4/3/2024</a:t>
+              <a:t>4/5/2024</a:t>
             </a:fld>
             <a:endParaRPr lang="en-US" dirty="0"/>
           </a:p>
@@ -2702,7 +2707,7 @@
           <a:p>
             <a:fld id="{DA16AA21-1863-4931-97CB-99D0A168701B}" type="datetimeFigureOut">
               <a:rPr lang="en-US" dirty="0"/>
-              <a:t>4/3/2024</a:t>
+              <a:t>4/5/2024</a:t>
             </a:fld>
             <a:endParaRPr lang="en-US" dirty="0"/>
           </a:p>
@@ -3122,7 +3127,7 @@
           <a:p>
             <a:fld id="{3772C379-9A7C-4C87-A116-CBE9F58B04C5}" type="datetimeFigureOut">
               <a:rPr lang="en-US" dirty="0"/>
-              <a:t>4/3/2024</a:t>
+              <a:t>4/5/2024</a:t>
             </a:fld>
             <a:endParaRPr lang="en-US" dirty="0"/>
           </a:p>
@@ -3398,7 +3403,7 @@
           <a:p>
             <a:fld id="{8664C608-40B1-4030-A28D-5B74BC98ADCE}" type="datetimeFigureOut">
               <a:rPr lang="en-US" dirty="0"/>
-              <a:t>4/3/2024</a:t>
+              <a:t>4/5/2024</a:t>
             </a:fld>
             <a:endParaRPr lang="en-US" dirty="0"/>
           </a:p>

</xml_diff>